<commit_message>
Added daniel's tutorial set
</commit_message>
<xml_diff>
--- a/ANDROID SHORT COURSE/UG Short Course Mobile Development.pptx
+++ b/ANDROID SHORT COURSE/UG Short Course Mobile Development.pptx
@@ -237,7 +237,7 @@
           <a:p>
             <a:fld id="{1C910ABD-EEEB-854F-9EF9-6C2446E36B79}" type="datetimeFigureOut">
               <a:rPr lang="en-US" smtClean="0"/>
-              <a:t>2/2/2019</a:t>
+              <a:t>2/5/2019</a:t>
             </a:fld>
             <a:endParaRPr lang="en-US"/>
           </a:p>
@@ -1234,7 +1234,7 @@
           <a:p>
             <a:fld id="{48A87A34-81AB-432B-8DAE-1953F412C126}" type="datetimeFigureOut">
               <a:rPr lang="en-US" smtClean="0"/>
-              <a:t>2/2/2019</a:t>
+              <a:t>2/5/2019</a:t>
             </a:fld>
             <a:endParaRPr lang="en-US" dirty="0"/>
           </a:p>
@@ -2367,7 +2367,7 @@
             <a:fld id="{48A87A34-81AB-432B-8DAE-1953F412C126}" type="datetimeFigureOut">
               <a:rPr lang="en-US" smtClean="0"/>
               <a:pPr/>
-              <a:t>2/2/2019</a:t>
+              <a:t>2/5/2019</a:t>
             </a:fld>
             <a:endParaRPr lang="en-US" dirty="0"/>
           </a:p>
@@ -3392,7 +3392,7 @@
             <a:fld id="{48A87A34-81AB-432B-8DAE-1953F412C126}" type="datetimeFigureOut">
               <a:rPr lang="en-US" smtClean="0"/>
               <a:pPr/>
-              <a:t>2/2/2019</a:t>
+              <a:t>2/5/2019</a:t>
             </a:fld>
             <a:endParaRPr lang="en-US" dirty="0"/>
           </a:p>
@@ -4576,7 +4576,7 @@
             <a:fld id="{48A87A34-81AB-432B-8DAE-1953F412C126}" type="datetimeFigureOut">
               <a:rPr lang="en-US" smtClean="0"/>
               <a:pPr/>
-              <a:t>2/2/2019</a:t>
+              <a:t>2/5/2019</a:t>
             </a:fld>
             <a:endParaRPr lang="en-US" dirty="0"/>
           </a:p>
@@ -5651,7 +5651,7 @@
             <a:fld id="{48A87A34-81AB-432B-8DAE-1953F412C126}" type="datetimeFigureOut">
               <a:rPr lang="en-US" smtClean="0"/>
               <a:pPr/>
-              <a:t>2/2/2019</a:t>
+              <a:t>2/5/2019</a:t>
             </a:fld>
             <a:endParaRPr lang="en-US" dirty="0"/>
           </a:p>
@@ -6311,7 +6311,7 @@
             <a:fld id="{48A87A34-81AB-432B-8DAE-1953F412C126}" type="datetimeFigureOut">
               <a:rPr lang="en-US" smtClean="0"/>
               <a:pPr/>
-              <a:t>2/2/2019</a:t>
+              <a:t>2/5/2019</a:t>
             </a:fld>
             <a:endParaRPr lang="en-US" dirty="0"/>
           </a:p>
@@ -7172,7 +7172,7 @@
             <a:fld id="{48A87A34-81AB-432B-8DAE-1953F412C126}" type="datetimeFigureOut">
               <a:rPr lang="en-US" smtClean="0"/>
               <a:pPr/>
-              <a:t>2/2/2019</a:t>
+              <a:t>2/5/2019</a:t>
             </a:fld>
             <a:endParaRPr lang="en-US" dirty="0"/>
           </a:p>
@@ -7360,7 +7360,7 @@
           <a:p>
             <a:fld id="{48A87A34-81AB-432B-8DAE-1953F412C126}" type="datetimeFigureOut">
               <a:rPr lang="en-US" smtClean="0"/>
-              <a:t>2/2/2019</a:t>
+              <a:t>2/5/2019</a:t>
             </a:fld>
             <a:endParaRPr lang="en-US" dirty="0"/>
           </a:p>
@@ -8370,7 +8370,7 @@
           <a:p>
             <a:fld id="{48A87A34-81AB-432B-8DAE-1953F412C126}" type="datetimeFigureOut">
               <a:rPr lang="en-US" smtClean="0"/>
-              <a:t>2/2/2019</a:t>
+              <a:t>2/5/2019</a:t>
             </a:fld>
             <a:endParaRPr lang="en-US" dirty="0"/>
           </a:p>
@@ -8588,7 +8588,7 @@
           <a:p>
             <a:fld id="{48A87A34-81AB-432B-8DAE-1953F412C126}" type="datetimeFigureOut">
               <a:rPr lang="en-US" smtClean="0"/>
-              <a:t>2/2/2019</a:t>
+              <a:t>2/5/2019</a:t>
             </a:fld>
             <a:endParaRPr lang="en-US" dirty="0"/>
           </a:p>
@@ -9662,7 +9662,7 @@
           <a:p>
             <a:fld id="{48A87A34-81AB-432B-8DAE-1953F412C126}" type="datetimeFigureOut">
               <a:rPr lang="en-US" smtClean="0"/>
-              <a:t>2/2/2019</a:t>
+              <a:t>2/5/2019</a:t>
             </a:fld>
             <a:endParaRPr lang="en-US" dirty="0"/>
           </a:p>
@@ -9946,7 +9946,7 @@
           <a:p>
             <a:fld id="{48A87A34-81AB-432B-8DAE-1953F412C126}" type="datetimeFigureOut">
               <a:rPr lang="en-US" smtClean="0"/>
-              <a:t>2/2/2019</a:t>
+              <a:t>2/5/2019</a:t>
             </a:fld>
             <a:endParaRPr lang="en-US" dirty="0"/>
           </a:p>
@@ -10340,7 +10340,7 @@
           <a:p>
             <a:fld id="{48A87A34-81AB-432B-8DAE-1953F412C126}" type="datetimeFigureOut">
               <a:rPr lang="en-US" smtClean="0"/>
-              <a:t>2/2/2019</a:t>
+              <a:t>2/5/2019</a:t>
             </a:fld>
             <a:endParaRPr lang="en-US" dirty="0"/>
           </a:p>
@@ -10470,7 +10470,7 @@
           <a:p>
             <a:fld id="{48A87A34-81AB-432B-8DAE-1953F412C126}" type="datetimeFigureOut">
               <a:rPr lang="en-US" smtClean="0"/>
-              <a:t>2/2/2019</a:t>
+              <a:t>2/5/2019</a:t>
             </a:fld>
             <a:endParaRPr lang="en-US" dirty="0"/>
           </a:p>
@@ -10577,7 +10577,7 @@
           <a:p>
             <a:fld id="{48A87A34-81AB-432B-8DAE-1953F412C126}" type="datetimeFigureOut">
               <a:rPr lang="en-US" smtClean="0"/>
-              <a:t>2/2/2019</a:t>
+              <a:t>2/5/2019</a:t>
             </a:fld>
             <a:endParaRPr lang="en-US" dirty="0"/>
           </a:p>
@@ -11698,7 +11698,7 @@
           <a:p>
             <a:fld id="{48A87A34-81AB-432B-8DAE-1953F412C126}" type="datetimeFigureOut">
               <a:rPr lang="en-US" smtClean="0"/>
-              <a:t>2/2/2019</a:t>
+              <a:t>2/5/2019</a:t>
             </a:fld>
             <a:endParaRPr lang="en-US" dirty="0"/>
           </a:p>
@@ -12843,7 +12843,7 @@
           <a:p>
             <a:fld id="{48A87A34-81AB-432B-8DAE-1953F412C126}" type="datetimeFigureOut">
               <a:rPr lang="en-US" smtClean="0"/>
-              <a:t>2/2/2019</a:t>
+              <a:t>2/5/2019</a:t>
             </a:fld>
             <a:endParaRPr lang="en-US" dirty="0"/>
           </a:p>
@@ -13884,7 +13884,7 @@
             <a:fld id="{48A87A34-81AB-432B-8DAE-1953F412C126}" type="datetimeFigureOut">
               <a:rPr lang="en-US" smtClean="0"/>
               <a:pPr/>
-              <a:t>2/2/2019</a:t>
+              <a:t>2/5/2019</a:t>
             </a:fld>
             <a:endParaRPr lang="en-US" dirty="0"/>
           </a:p>
@@ -15293,7 +15293,7 @@
         <p:spPr/>
         <p:txBody>
           <a:bodyPr>
-            <a:normAutofit/>
+            <a:normAutofit fontScale="70000" lnSpcReduction="20000"/>
           </a:bodyPr>
           <a:lstStyle/>
           <a:p>
@@ -15325,20 +15325,21 @@
               <a:buNone/>
             </a:pPr>
             <a:r>
+              <a:rPr lang="en-US" dirty="0"/>
+              <a:t>Java:</a:t>
+            </a:r>
+          </a:p>
+          <a:p>
+            <a:pPr marL="0" indent="0">
+              <a:buNone/>
+            </a:pPr>
+            <a:r>
               <a:rPr lang="en-US" dirty="0" err="1"/>
               <a:t>MyClass</a:t>
             </a:r>
             <a:r>
               <a:rPr lang="en-US" dirty="0"/>
-              <a:t> </a:t>
-            </a:r>
-            <a:r>
-              <a:rPr lang="en-US" dirty="0" err="1"/>
-              <a:t>obj</a:t>
-            </a:r>
-            <a:r>
-              <a:rPr lang="en-US" dirty="0"/>
-              <a:t> = new </a:t>
+              <a:t> obj = new </a:t>
             </a:r>
             <a:r>
               <a:rPr lang="en-US" dirty="0" err="1"/>
@@ -15361,7 +15362,20 @@
             </a:pPr>
             <a:r>
               <a:rPr lang="en-US" dirty="0"/>
-              <a:t>If you look at the right-hand side of this statement, we are calling the default constructor class </a:t>
+              <a:t>Kotlin:</a:t>
+            </a:r>
+          </a:p>
+          <a:p>
+            <a:pPr marL="0" indent="0">
+              <a:buNone/>
+            </a:pPr>
+            <a:r>
+              <a:rPr lang="en-US" dirty="0" err="1"/>
+              <a:t>val</a:t>
+            </a:r>
+            <a:r>
+              <a:rPr lang="en-US" dirty="0"/>
+              <a:t> obj: </a:t>
             </a:r>
             <a:r>
               <a:rPr lang="en-US" dirty="0" err="1"/>
@@ -15369,7 +15383,38 @@
             </a:r>
             <a:r>
               <a:rPr lang="en-US" dirty="0"/>
-              <a:t> to create a new object (or instance).</a:t>
+              <a:t> = </a:t>
+            </a:r>
+            <a:r>
+              <a:rPr lang="en-US" dirty="0" err="1"/>
+              <a:t>MyClass</a:t>
+            </a:r>
+            <a:r>
+              <a:rPr lang="en-US" dirty="0"/>
+              <a:t>()</a:t>
+            </a:r>
+          </a:p>
+          <a:p>
+            <a:pPr marL="0" indent="0">
+              <a:buNone/>
+            </a:pPr>
+            <a:endParaRPr lang="en-US" dirty="0"/>
+          </a:p>
+          <a:p>
+            <a:pPr marL="0" indent="0">
+              <a:buNone/>
+            </a:pPr>
+            <a:r>
+              <a:rPr lang="en-US" dirty="0"/>
+              <a:t>If you look at the right-hand side of this statement, we are calling the default constructor class </a:t>
+            </a:r>
+            <a:r>
+              <a:rPr lang="en-US" dirty="0" err="1"/>
+              <a:t>MyClass</a:t>
+            </a:r>
+            <a:r>
+              <a:rPr lang="en-US" dirty="0"/>
+              <a:t> to create a new object (or instance). </a:t>
             </a:r>
           </a:p>
         </p:txBody>
@@ -15492,15 +15537,7 @@
             </a:pPr>
             <a:r>
               <a:rPr lang="en-US" dirty="0"/>
-              <a:t>2. </a:t>
-            </a:r>
-            <a:r>
-              <a:rPr lang="en-US"/>
-              <a:t>No-argument </a:t>
-            </a:r>
-            <a:r>
-              <a:rPr lang="en-US" dirty="0"/>
-              <a:t>constructor</a:t>
+              <a:t>2. No-argument constructor</a:t>
             </a:r>
           </a:p>
           <a:p>

</xml_diff>